<commit_message>
Presentations update - Test Progress Monitoring and Control; Test Planning and Estimation
</commit_message>
<xml_diff>
--- a/07. Test Management/Test Progress Monitoring and Control.pptx
+++ b/07. Test Management/Test Progress Monitoring and Control.pptx
@@ -5,7 +5,7 @@
     <p:sldMasterId id="2147483660" r:id="rId1"/>
   </p:sldMasterIdLst>
   <p:notesMasterIdLst>
-    <p:notesMasterId r:id="rId26"/>
+    <p:notesMasterId r:id="rId25"/>
   </p:notesMasterIdLst>
   <p:sldIdLst>
     <p:sldId id="261" r:id="rId2"/>
@@ -25,13 +25,12 @@
     <p:sldId id="275" r:id="rId16"/>
     <p:sldId id="276" r:id="rId17"/>
     <p:sldId id="277" r:id="rId18"/>
-    <p:sldId id="278" r:id="rId19"/>
-    <p:sldId id="279" r:id="rId20"/>
-    <p:sldId id="280" r:id="rId21"/>
-    <p:sldId id="281" r:id="rId22"/>
-    <p:sldId id="282" r:id="rId23"/>
-    <p:sldId id="283" r:id="rId24"/>
-    <p:sldId id="285" r:id="rId25"/>
+    <p:sldId id="279" r:id="rId19"/>
+    <p:sldId id="280" r:id="rId20"/>
+    <p:sldId id="281" r:id="rId21"/>
+    <p:sldId id="282" r:id="rId22"/>
+    <p:sldId id="283" r:id="rId23"/>
+    <p:sldId id="285" r:id="rId24"/>
   </p:sldIdLst>
   <p:sldSz cx="9144000" cy="6858000" type="screen4x3"/>
   <p:notesSz cx="6858000" cy="9144000"/>
@@ -8706,225 +8705,6 @@
 </file>
 
 <file path=ppt/slides/slide18.xml><?xml version="1.0" encoding="utf-8"?>
-<p:sld xmlns:a="http://schemas.openxmlformats.org/drawingml/2006/main" xmlns:r="http://schemas.openxmlformats.org/officeDocument/2006/relationships" xmlns:p="http://schemas.openxmlformats.org/presentationml/2006/main" show="0">
-  <p:cSld>
-    <p:spTree>
-      <p:nvGrpSpPr>
-        <p:cNvPr id="1" name=""/>
-        <p:cNvGrpSpPr/>
-        <p:nvPr/>
-      </p:nvGrpSpPr>
-      <p:grpSpPr>
-        <a:xfrm>
-          <a:off x="0" y="0"/>
-          <a:ext cx="0" cy="0"/>
-          <a:chOff x="0" y="0"/>
-          <a:chExt cx="0" cy="0"/>
-        </a:xfrm>
-      </p:grpSpPr>
-      <p:sp>
-        <p:nvSpPr>
-          <p:cNvPr id="2" name="Title 1"/>
-          <p:cNvSpPr>
-            <a:spLocks noGrp="1"/>
-          </p:cNvSpPr>
-          <p:nvPr>
-            <p:ph type="ctrTitle"/>
-          </p:nvPr>
-        </p:nvSpPr>
-        <p:spPr>
-          <a:xfrm>
-            <a:off x="609600" y="1600200"/>
-            <a:ext cx="4191000" cy="1295401"/>
-          </a:xfrm>
-        </p:spPr>
-        <p:txBody>
-          <a:bodyPr/>
-          <a:lstStyle/>
-          <a:p>
-            <a:r>
-              <a:rPr lang="en-US" dirty="0" smtClean="0"/>
-              <a:t>Test Summary Report</a:t>
-            </a:r>
-            <a:endParaRPr lang="en-US" dirty="0"/>
-          </a:p>
-        </p:txBody>
-      </p:sp>
-      <p:sp>
-        <p:nvSpPr>
-          <p:cNvPr id="3" name="Subtitle 2"/>
-          <p:cNvSpPr>
-            <a:spLocks noGrp="1"/>
-          </p:cNvSpPr>
-          <p:nvPr>
-            <p:ph type="subTitle" idx="1"/>
-          </p:nvPr>
-        </p:nvSpPr>
-        <p:spPr>
-          <a:xfrm>
-            <a:off x="609600" y="3469480"/>
-            <a:ext cx="4267200" cy="569120"/>
-          </a:xfrm>
-        </p:spPr>
-        <p:txBody>
-          <a:bodyPr/>
-          <a:lstStyle/>
-          <a:p>
-            <a:r>
-              <a:rPr lang="en-US" dirty="0"/>
-              <a:t>D</a:t>
-            </a:r>
-            <a:r>
-              <a:rPr lang="en-US" dirty="0" smtClean="0"/>
-              <a:t>emo</a:t>
-            </a:r>
-            <a:endParaRPr lang="en-US" dirty="0"/>
-          </a:p>
-        </p:txBody>
-      </p:sp>
-      <p:pic>
-        <p:nvPicPr>
-          <p:cNvPr id="10241" name="Picture 1"/>
-          <p:cNvPicPr>
-            <a:picLocks noChangeAspect="1" noChangeArrowheads="1"/>
-          </p:cNvPicPr>
-          <p:nvPr/>
-        </p:nvPicPr>
-        <p:blipFill>
-          <a:blip r:embed="rId2">
-            <a:extLst>
-              <a:ext uri="{28A0092B-C50C-407E-A947-70E740481C1C}">
-                <a14:useLocalDpi xmlns:a14="http://schemas.microsoft.com/office/drawing/2010/main" val="0"/>
-              </a:ext>
-            </a:extLst>
-          </a:blip>
-          <a:srcRect/>
-          <a:stretch>
-            <a:fillRect/>
-          </a:stretch>
-        </p:blipFill>
-        <p:spPr bwMode="auto">
-          <a:xfrm>
-            <a:off x="4572000" y="2971800"/>
-            <a:ext cx="2671762" cy="2612390"/>
-          </a:xfrm>
-          <a:prstGeom prst="roundRect">
-            <a:avLst>
-              <a:gd name="adj" fmla="val 11111"/>
-            </a:avLst>
-          </a:prstGeom>
-          <a:noFill/>
-          <a:ln>
-            <a:noFill/>
-          </a:ln>
-          <a:effectLst>
-            <a:glow rad="101600">
-              <a:schemeClr val="tx1">
-                <a:alpha val="40000"/>
-              </a:schemeClr>
-            </a:glow>
-            <a:outerShdw dist="35921" dir="2700000" algn="ctr" rotWithShape="0">
-              <a:schemeClr val="bg2"/>
-            </a:outerShdw>
-          </a:effectLst>
-          <a:extLst>
-            <a:ext uri="{909E8E84-426E-40DD-AFC4-6F175D3DCCD1}">
-              <a14:hiddenFill xmlns:a14="http://schemas.microsoft.com/office/drawing/2010/main">
-                <a:solidFill>
-                  <a:schemeClr val="accent1"/>
-                </a:solidFill>
-              </a14:hiddenFill>
-            </a:ext>
-            <a:ext uri="{91240B29-F687-4F45-9708-019B960494DF}">
-              <a14:hiddenLine xmlns:a14="http://schemas.microsoft.com/office/drawing/2010/main" w="9525">
-                <a:solidFill>
-                  <a:schemeClr val="tx1"/>
-                </a:solidFill>
-                <a:miter lim="800000"/>
-                <a:headEnd/>
-                <a:tailEnd/>
-              </a14:hiddenLine>
-            </a:ext>
-          </a:extLst>
-        </p:spPr>
-      </p:pic>
-      <p:pic>
-        <p:nvPicPr>
-          <p:cNvPr id="4" name="Picture 5" descr="http://www.marketingvox.com/wp/wp-content/uploads/2008/04/job-well-done.thumbnail.jpg"/>
-          <p:cNvPicPr>
-            <a:picLocks noChangeAspect="1" noChangeArrowheads="1"/>
-          </p:cNvPicPr>
-          <p:nvPr/>
-        </p:nvPicPr>
-        <p:blipFill>
-          <a:blip r:embed="rId3">
-            <a:extLst>
-              <a:ext uri="{28A0092B-C50C-407E-A947-70E740481C1C}">
-                <a14:useLocalDpi xmlns:a14="http://schemas.microsoft.com/office/drawing/2010/main" val="0"/>
-              </a:ext>
-            </a:extLst>
-          </a:blip>
-          <a:srcRect/>
-          <a:stretch>
-            <a:fillRect/>
-          </a:stretch>
-        </p:blipFill>
-        <p:spPr bwMode="auto">
-          <a:xfrm>
-            <a:off x="6705600" y="1600200"/>
-            <a:ext cx="1676400" cy="1676400"/>
-          </a:xfrm>
-          <a:prstGeom prst="roundRect">
-            <a:avLst/>
-          </a:prstGeom>
-          <a:noFill/>
-          <a:effectLst>
-            <a:glow rad="101600">
-              <a:schemeClr val="tx1">
-                <a:alpha val="40000"/>
-              </a:schemeClr>
-            </a:glow>
-          </a:effectLst>
-          <a:extLst>
-            <a:ext uri="{909E8E84-426E-40DD-AFC4-6F175D3DCCD1}">
-              <a14:hiddenFill xmlns:a14="http://schemas.microsoft.com/office/drawing/2010/main">
-                <a:solidFill>
-                  <a:srgbClr val="FFFFFF"/>
-                </a:solidFill>
-              </a14:hiddenFill>
-            </a:ext>
-          </a:extLst>
-        </p:spPr>
-      </p:pic>
-    </p:spTree>
-    <p:extLst>
-      <p:ext uri="{BB962C8B-B14F-4D97-AF65-F5344CB8AC3E}">
-        <p14:creationId xmlns:p14="http://schemas.microsoft.com/office/powerpoint/2010/main" val="445576128"/>
-      </p:ext>
-    </p:extLst>
-  </p:cSld>
-  <p:clrMapOvr>
-    <a:masterClrMapping/>
-  </p:clrMapOvr>
-  <mc:AlternateContent xmlns:mc="http://schemas.openxmlformats.org/markup-compatibility/2006" xmlns:p14="http://schemas.microsoft.com/office/powerpoint/2010/main">
-    <mc:Choice Requires="p14">
-      <p:transition spd="slow" p14:dur="2000"/>
-    </mc:Choice>
-    <mc:Fallback xmlns="">
-      <p:transition spd="slow"/>
-    </mc:Fallback>
-  </mc:AlternateContent>
-  <p:timing>
-    <p:tnLst>
-      <p:par>
-        <p:cTn id="1" dur="indefinite" restart="never" nodeType="tmRoot"/>
-      </p:par>
-    </p:tnLst>
-  </p:timing>
-</p:sld>
-</file>
-
-<file path=ppt/slides/slide19.xml><?xml version="1.0" encoding="utf-8"?>
 <p:sld xmlns:a="http://schemas.openxmlformats.org/drawingml/2006/main" xmlns:r="http://schemas.openxmlformats.org/officeDocument/2006/relationships" xmlns:p="http://schemas.openxmlformats.org/presentationml/2006/main">
   <p:cSld>
     <p:spTree>
@@ -9037,6 +8817,228 @@
     <p:extLst>
       <p:ext uri="{BB962C8B-B14F-4D97-AF65-F5344CB8AC3E}">
         <p14:creationId xmlns:p14="http://schemas.microsoft.com/office/powerpoint/2010/main" val="1278215173"/>
+      </p:ext>
+    </p:extLst>
+  </p:cSld>
+  <p:clrMapOvr>
+    <a:masterClrMapping/>
+  </p:clrMapOvr>
+  <p:timing>
+    <p:tnLst>
+      <p:par>
+        <p:cTn id="1" dur="indefinite" restart="never" nodeType="tmRoot"/>
+      </p:par>
+    </p:tnLst>
+  </p:timing>
+</p:sld>
+</file>
+
+<file path=ppt/slides/slide19.xml><?xml version="1.0" encoding="utf-8"?>
+<p:sld xmlns:a="http://schemas.openxmlformats.org/drawingml/2006/main" xmlns:r="http://schemas.openxmlformats.org/officeDocument/2006/relationships" xmlns:p="http://schemas.openxmlformats.org/presentationml/2006/main">
+  <p:cSld>
+    <p:spTree>
+      <p:nvGrpSpPr>
+        <p:cNvPr id="1" name=""/>
+        <p:cNvGrpSpPr/>
+        <p:nvPr/>
+      </p:nvGrpSpPr>
+      <p:grpSpPr>
+        <a:xfrm>
+          <a:off x="0" y="0"/>
+          <a:ext cx="0" cy="0"/>
+          <a:chOff x="0" y="0"/>
+          <a:chExt cx="0" cy="0"/>
+        </a:xfrm>
+      </p:grpSpPr>
+      <p:sp>
+        <p:nvSpPr>
+          <p:cNvPr id="2" name="Title 1"/>
+          <p:cNvSpPr>
+            <a:spLocks noGrp="1"/>
+          </p:cNvSpPr>
+          <p:nvPr>
+            <p:ph type="title"/>
+          </p:nvPr>
+        </p:nvSpPr>
+        <p:spPr/>
+        <p:txBody>
+          <a:bodyPr/>
+          <a:lstStyle/>
+          <a:p>
+            <a:r>
+              <a:rPr lang="en-US" dirty="0" smtClean="0"/>
+              <a:t>Test Control</a:t>
+            </a:r>
+            <a:endParaRPr lang="en-US" dirty="0"/>
+          </a:p>
+        </p:txBody>
+      </p:sp>
+      <p:sp>
+        <p:nvSpPr>
+          <p:cNvPr id="3" name="Content Placeholder 2"/>
+          <p:cNvSpPr>
+            <a:spLocks noGrp="1"/>
+          </p:cNvSpPr>
+          <p:nvPr>
+            <p:ph idx="1"/>
+          </p:nvPr>
+        </p:nvSpPr>
+        <p:spPr/>
+        <p:txBody>
+          <a:bodyPr/>
+          <a:lstStyle/>
+          <a:p>
+            <a:r>
+              <a:rPr lang="en-US" dirty="0" smtClean="0"/>
+              <a:t>Testing sometimes gets delayed according to the test schedule</a:t>
+            </a:r>
+          </a:p>
+          <a:p>
+            <a:r>
+              <a:rPr lang="en-US" dirty="0" smtClean="0"/>
+              <a:t>Test control is about </a:t>
+            </a:r>
+            <a:r>
+              <a:rPr lang="en-US" dirty="0" smtClean="0">
+                <a:solidFill>
+                  <a:schemeClr val="accent5">
+                    <a:lumMod val="20000"/>
+                    <a:lumOff val="80000"/>
+                  </a:schemeClr>
+                </a:solidFill>
+              </a:rPr>
+              <a:t>guiding </a:t>
+            </a:r>
+            <a:r>
+              <a:rPr lang="en-US" dirty="0" smtClean="0"/>
+              <a:t>and </a:t>
+            </a:r>
+            <a:r>
+              <a:rPr lang="en-US" dirty="0" smtClean="0">
+                <a:solidFill>
+                  <a:schemeClr val="accent5">
+                    <a:lumMod val="20000"/>
+                    <a:lumOff val="80000"/>
+                  </a:schemeClr>
+                </a:solidFill>
+              </a:rPr>
+              <a:t>corrective actions </a:t>
+            </a:r>
+          </a:p>
+          <a:p>
+            <a:pPr lvl="1"/>
+            <a:r>
+              <a:rPr lang="en-US" dirty="0" smtClean="0"/>
+              <a:t>Trying </a:t>
+            </a:r>
+            <a:r>
+              <a:rPr lang="en-US" dirty="0"/>
+              <a:t>to achieve the best possible outcome for the </a:t>
+            </a:r>
+            <a:r>
+              <a:rPr lang="en-US" dirty="0" smtClean="0"/>
+              <a:t>project</a:t>
+            </a:r>
+          </a:p>
+        </p:txBody>
+      </p:sp>
+      <p:sp>
+        <p:nvSpPr>
+          <p:cNvPr id="4" name="Slide Number Placeholder 3"/>
+          <p:cNvSpPr>
+            <a:spLocks noGrp="1"/>
+          </p:cNvSpPr>
+          <p:nvPr>
+            <p:ph type="sldNum" sz="quarter" idx="10"/>
+          </p:nvPr>
+        </p:nvSpPr>
+        <p:spPr/>
+        <p:txBody>
+          <a:bodyPr/>
+          <a:lstStyle/>
+          <a:p>
+            <a:pPr>
+              <a:defRPr/>
+            </a:pPr>
+            <a:fld id="{58452FF4-89E3-4D1B-9927-2DBDC00E58D7}" type="slidenum">
+              <a:rPr lang="en-US" smtClean="0"/>
+              <a:pPr>
+                <a:defRPr/>
+              </a:pPr>
+              <a:t>19</a:t>
+            </a:fld>
+            <a:endParaRPr lang="en-US" dirty="0"/>
+          </a:p>
+        </p:txBody>
+      </p:sp>
+      <p:pic>
+        <p:nvPicPr>
+          <p:cNvPr id="14338" name="Picture 2"/>
+          <p:cNvPicPr>
+            <a:picLocks noChangeAspect="1" noChangeArrowheads="1"/>
+          </p:cNvPicPr>
+          <p:nvPr/>
+        </p:nvPicPr>
+        <p:blipFill>
+          <a:blip r:embed="rId2">
+            <a:extLst>
+              <a:ext uri="{28A0092B-C50C-407E-A947-70E740481C1C}">
+                <a14:useLocalDpi xmlns:a14="http://schemas.microsoft.com/office/drawing/2010/main" val="0"/>
+              </a:ext>
+            </a:extLst>
+          </a:blip>
+          <a:srcRect/>
+          <a:stretch>
+            <a:fillRect/>
+          </a:stretch>
+        </p:blipFill>
+        <p:spPr bwMode="auto">
+          <a:xfrm>
+            <a:off x="5486400" y="4419600"/>
+            <a:ext cx="2971800" cy="1987278"/>
+          </a:xfrm>
+          <a:prstGeom prst="roundRect">
+            <a:avLst/>
+          </a:prstGeom>
+          <a:noFill/>
+          <a:ln>
+            <a:noFill/>
+          </a:ln>
+          <a:effectLst>
+            <a:glow rad="101600">
+              <a:schemeClr val="tx1">
+                <a:alpha val="40000"/>
+              </a:schemeClr>
+            </a:glow>
+            <a:outerShdw dist="35921" dir="2700000" algn="ctr" rotWithShape="0">
+              <a:schemeClr val="bg2"/>
+            </a:outerShdw>
+          </a:effectLst>
+          <a:extLst>
+            <a:ext uri="{909E8E84-426E-40DD-AFC4-6F175D3DCCD1}">
+              <a14:hiddenFill xmlns:a14="http://schemas.microsoft.com/office/drawing/2010/main">
+                <a:solidFill>
+                  <a:schemeClr val="accent1"/>
+                </a:solidFill>
+              </a14:hiddenFill>
+            </a:ext>
+            <a:ext uri="{91240B29-F687-4F45-9708-019B960494DF}">
+              <a14:hiddenLine xmlns:a14="http://schemas.microsoft.com/office/drawing/2010/main" w="9525">
+                <a:solidFill>
+                  <a:schemeClr val="tx1"/>
+                </a:solidFill>
+                <a:miter lim="800000"/>
+                <a:headEnd/>
+                <a:tailEnd/>
+              </a14:hiddenLine>
+            </a:ext>
+          </a:extLst>
+        </p:spPr>
+      </p:pic>
+    </p:spTree>
+    <p:extLst>
+      <p:ext uri="{BB962C8B-B14F-4D97-AF65-F5344CB8AC3E}">
+        <p14:creationId xmlns:p14="http://schemas.microsoft.com/office/powerpoint/2010/main" val="4248779872"/>
       </p:ext>
     </p:extLst>
   </p:cSld>
@@ -9436,7 +9438,7 @@
           <a:p>
             <a:r>
               <a:rPr lang="en-US" dirty="0" smtClean="0"/>
-              <a:t>Test Control</a:t>
+              <a:t>What Can Be Done?</a:t>
             </a:r>
             <a:endParaRPr lang="en-US" dirty="0"/>
           </a:p>
@@ -9459,54 +9461,70 @@
           <a:p>
             <a:r>
               <a:rPr lang="en-US" dirty="0" smtClean="0"/>
-              <a:t>Testing sometimes gets delayed according to the test schedule</a:t>
-            </a:r>
-          </a:p>
-          <a:p>
-            <a:r>
-              <a:rPr lang="en-US" dirty="0" smtClean="0"/>
-              <a:t>Test control is about </a:t>
-            </a:r>
-            <a:r>
-              <a:rPr lang="en-US" dirty="0" smtClean="0">
-                <a:solidFill>
-                  <a:schemeClr val="accent5">
-                    <a:lumMod val="20000"/>
-                    <a:lumOff val="80000"/>
-                  </a:schemeClr>
-                </a:solidFill>
-              </a:rPr>
-              <a:t>guiding </a:t>
-            </a:r>
-            <a:r>
-              <a:rPr lang="en-US" dirty="0" smtClean="0"/>
-              <a:t>and </a:t>
-            </a:r>
-            <a:r>
-              <a:rPr lang="en-US" dirty="0" smtClean="0">
-                <a:solidFill>
-                  <a:schemeClr val="accent5">
-                    <a:lumMod val="20000"/>
-                    <a:lumOff val="80000"/>
-                  </a:schemeClr>
-                </a:solidFill>
-              </a:rPr>
-              <a:t>corrective actions </a:t>
+              <a:t>What can be done to correct a delay?</a:t>
             </a:r>
           </a:p>
           <a:p>
             <a:pPr lvl="1"/>
             <a:r>
               <a:rPr lang="en-US" dirty="0" smtClean="0"/>
-              <a:t>Trying </a:t>
+              <a:t>Additional test resources can be requested</a:t>
+            </a:r>
+          </a:p>
+          <a:p>
+            <a:pPr lvl="2"/>
+            <a:r>
+              <a:rPr lang="en-US" dirty="0" smtClean="0"/>
+              <a:t>E.g., personnel</a:t>
             </a:r>
             <a:r>
               <a:rPr lang="en-US" dirty="0"/>
-              <a:t>to achieve the best possible outcome for the </a:t>
-            </a:r>
-            <a:r>
-              <a:rPr lang="en-US" dirty="0" smtClean="0"/>
-              <a:t>project</a:t>
+              <a:t>, workstations, </a:t>
+            </a:r>
+            <a:r>
+              <a:rPr lang="en-US" dirty="0" smtClean="0"/>
+              <a:t>equipment</a:t>
+            </a:r>
+            <a:r>
+              <a:rPr lang="en-US" dirty="0"/>
+              <a:t>, and </a:t>
+            </a:r>
+            <a:r>
+              <a:rPr lang="en-US" dirty="0" smtClean="0"/>
+              <a:t>tools</a:t>
+            </a:r>
+          </a:p>
+          <a:p>
+            <a:pPr lvl="1"/>
+            <a:r>
+              <a:rPr lang="en-US" dirty="0" smtClean="0"/>
+              <a:t>The </a:t>
+            </a:r>
+            <a:r>
+              <a:rPr lang="en-US" dirty="0"/>
+              <a:t>test plan itself </a:t>
+            </a:r>
+            <a:r>
+              <a:rPr lang="en-US" dirty="0" smtClean="0"/>
+              <a:t>can be adapted</a:t>
+            </a:r>
+          </a:p>
+          <a:p>
+            <a:pPr lvl="2"/>
+            <a:r>
+              <a:rPr lang="en-US" dirty="0"/>
+              <a:t>Test cases with low </a:t>
+            </a:r>
+            <a:r>
+              <a:rPr lang="en-US" dirty="0" smtClean="0"/>
+              <a:t>priority can be omitted</a:t>
+            </a:r>
+          </a:p>
+          <a:p>
+            <a:pPr lvl="2"/>
+            <a:r>
+              <a:rPr lang="en-US" dirty="0" smtClean="0"/>
+              <a:t>Test cases with multiple variants can be run in just a single variant</a:t>
             </a:r>
           </a:p>
         </p:txBody>
@@ -9540,87 +9558,16 @@
           </a:p>
         </p:txBody>
       </p:sp>
-      <p:pic>
-        <p:nvPicPr>
-          <p:cNvPr id="14338" name="Picture 2"/>
-          <p:cNvPicPr>
-            <a:picLocks noChangeAspect="1" noChangeArrowheads="1"/>
-          </p:cNvPicPr>
-          <p:nvPr/>
-        </p:nvPicPr>
-        <p:blipFill>
-          <a:blip r:embed="rId2">
-            <a:extLst>
-              <a:ext uri="{28A0092B-C50C-407E-A947-70E740481C1C}">
-                <a14:useLocalDpi xmlns:a14="http://schemas.microsoft.com/office/drawing/2010/main" val="0"/>
-              </a:ext>
-            </a:extLst>
-          </a:blip>
-          <a:srcRect/>
-          <a:stretch>
-            <a:fillRect/>
-          </a:stretch>
-        </p:blipFill>
-        <p:spPr bwMode="auto">
-          <a:xfrm>
-            <a:off x="5486400" y="4419600"/>
-            <a:ext cx="2971800" cy="1987278"/>
-          </a:xfrm>
-          <a:prstGeom prst="roundRect">
-            <a:avLst/>
-          </a:prstGeom>
-          <a:noFill/>
-          <a:ln>
-            <a:noFill/>
-          </a:ln>
-          <a:effectLst>
-            <a:glow rad="101600">
-              <a:schemeClr val="tx1">
-                <a:alpha val="40000"/>
-              </a:schemeClr>
-            </a:glow>
-            <a:outerShdw dist="35921" dir="2700000" algn="ctr" rotWithShape="0">
-              <a:schemeClr val="bg2"/>
-            </a:outerShdw>
-          </a:effectLst>
-          <a:extLst>
-            <a:ext uri="{909E8E84-426E-40DD-AFC4-6F175D3DCCD1}">
-              <a14:hiddenFill xmlns:a14="http://schemas.microsoft.com/office/drawing/2010/main">
-                <a:solidFill>
-                  <a:schemeClr val="accent1"/>
-                </a:solidFill>
-              </a14:hiddenFill>
-            </a:ext>
-            <a:ext uri="{91240B29-F687-4F45-9708-019B960494DF}">
-              <a14:hiddenLine xmlns:a14="http://schemas.microsoft.com/office/drawing/2010/main" w="9525">
-                <a:solidFill>
-                  <a:schemeClr val="tx1"/>
-                </a:solidFill>
-                <a:miter lim="800000"/>
-                <a:headEnd/>
-                <a:tailEnd/>
-              </a14:hiddenLine>
-            </a:ext>
-          </a:extLst>
-        </p:spPr>
-      </p:pic>
     </p:spTree>
     <p:extLst>
       <p:ext uri="{BB962C8B-B14F-4D97-AF65-F5344CB8AC3E}">
-        <p14:creationId xmlns:p14="http://schemas.microsoft.com/office/powerpoint/2010/main" val="4248779872"/>
+        <p14:creationId xmlns:p14="http://schemas.microsoft.com/office/powerpoint/2010/main" val="3360248241"/>
       </p:ext>
     </p:extLst>
   </p:cSld>
   <p:clrMapOvr>
     <a:masterClrMapping/>
   </p:clrMapOvr>
-  <p:timing>
-    <p:tnLst>
-      <p:par>
-        <p:cTn id="1" dur="indefinite" restart="never" nodeType="tmRoot"/>
-      </p:par>
-    </p:tnLst>
-  </p:timing>
 </p:sld>
 </file>
 
@@ -9658,7 +9605,7 @@
           <a:p>
             <a:r>
               <a:rPr lang="en-US" dirty="0" smtClean="0"/>
-              <a:t>What Can Be Done?</a:t>
+              <a:t>Communicating Changes</a:t>
             </a:r>
             <a:endParaRPr lang="en-US" dirty="0"/>
           </a:p>
@@ -9680,72 +9627,60 @@
           <a:lstStyle/>
           <a:p>
             <a:r>
-              <a:rPr lang="en-US" dirty="0" smtClean="0"/>
-              <a:t>What can be done to correct a delay?</a:t>
+              <a:rPr lang="en-US" dirty="0"/>
+              <a:t>Changes to test plan must be communicated </a:t>
+            </a:r>
+            <a:r>
+              <a:rPr lang="en-US" dirty="0" smtClean="0"/>
+              <a:t>clearly</a:t>
             </a:r>
           </a:p>
           <a:p>
             <a:pPr lvl="1"/>
             <a:r>
               <a:rPr lang="en-US" dirty="0" smtClean="0"/>
-              <a:t>Additional test resources can be requested</a:t>
-            </a:r>
-          </a:p>
-          <a:p>
-            <a:pPr lvl="2"/>
-            <a:r>
-              <a:rPr lang="en-US" dirty="0" smtClean="0"/>
-              <a:t>E.g., personnel</a:t>
+              <a:t>Changes </a:t>
             </a:r>
             <a:r>
               <a:rPr lang="en-US" dirty="0"/>
-              <a:t>, workstations, </a:t>
-            </a:r>
-            <a:r>
-              <a:rPr lang="en-US" dirty="0" smtClean="0"/>
-              <a:t>equipment</a:t>
-            </a:r>
+              <a:t>in the test plan may increase the release risk</a:t>
+            </a:r>
+          </a:p>
+          <a:p>
+            <a:pPr lvl="1"/>
             <a:r>
               <a:rPr lang="en-US" dirty="0"/>
-              <a:t>, and </a:t>
-            </a:r>
-            <a:r>
-              <a:rPr lang="en-US" dirty="0" smtClean="0"/>
-              <a:t>tools</a:t>
-            </a:r>
-          </a:p>
-          <a:p>
-            <a:pPr lvl="1"/>
-            <a:r>
-              <a:rPr lang="en-US" dirty="0" smtClean="0"/>
-              <a:t>The </a:t>
+              <a:t>T</a:t>
+            </a:r>
+            <a:r>
+              <a:rPr lang="en-US" dirty="0" smtClean="0"/>
+              <a:t>he </a:t>
             </a:r>
             <a:r>
               <a:rPr lang="en-US" dirty="0"/>
-              <a:t>test plan itself </a:t>
-            </a:r>
-            <a:r>
-              <a:rPr lang="en-US" dirty="0" smtClean="0"/>
-              <a:t>can be adapted</a:t>
-            </a:r>
-          </a:p>
-          <a:p>
-            <a:pPr lvl="2"/>
+              <a:t>test </a:t>
+            </a:r>
+            <a:r>
+              <a:rPr lang="en-US" dirty="0" smtClean="0"/>
+              <a:t>manager has to document </a:t>
+            </a:r>
             <a:r>
               <a:rPr lang="en-US" dirty="0"/>
-              <a:t>Test cases with low </a:t>
-            </a:r>
-            <a:r>
-              <a:rPr lang="en-US" dirty="0" smtClean="0"/>
-              <a:t>priority can be omitted</a:t>
-            </a:r>
-          </a:p>
-          <a:p>
-            <a:pPr lvl="2"/>
-            <a:r>
-              <a:rPr lang="en-US" dirty="0" smtClean="0"/>
-              <a:t>Test cases with multiple variants can be run in just a single variant</a:t>
-            </a:r>
+              <a:t>and </a:t>
+            </a:r>
+            <a:r>
+              <a:rPr lang="en-US" dirty="0" smtClean="0"/>
+              <a:t>communicate </a:t>
+            </a:r>
+            <a:r>
+              <a:rPr lang="en-US" dirty="0"/>
+              <a:t>every change in the </a:t>
+            </a:r>
+            <a:r>
+              <a:rPr lang="en-US" dirty="0" smtClean="0"/>
+              <a:t>plans</a:t>
+            </a:r>
+            <a:endParaRPr lang="en-US" dirty="0"/>
           </a:p>
         </p:txBody>
       </p:sp>
@@ -9773,161 +9708,6 @@
                 <a:defRPr/>
               </a:pPr>
               <a:t>21</a:t>
-            </a:fld>
-            <a:endParaRPr lang="en-US" dirty="0"/>
-          </a:p>
-        </p:txBody>
-      </p:sp>
-    </p:spTree>
-    <p:extLst>
-      <p:ext uri="{BB962C8B-B14F-4D97-AF65-F5344CB8AC3E}">
-        <p14:creationId xmlns:p14="http://schemas.microsoft.com/office/powerpoint/2010/main" val="3360248241"/>
-      </p:ext>
-    </p:extLst>
-  </p:cSld>
-  <p:clrMapOvr>
-    <a:masterClrMapping/>
-  </p:clrMapOvr>
-</p:sld>
-</file>
-
-<file path=ppt/slides/slide22.xml><?xml version="1.0" encoding="utf-8"?>
-<p:sld xmlns:a="http://schemas.openxmlformats.org/drawingml/2006/main" xmlns:r="http://schemas.openxmlformats.org/officeDocument/2006/relationships" xmlns:p="http://schemas.openxmlformats.org/presentationml/2006/main">
-  <p:cSld>
-    <p:spTree>
-      <p:nvGrpSpPr>
-        <p:cNvPr id="1" name=""/>
-        <p:cNvGrpSpPr/>
-        <p:nvPr/>
-      </p:nvGrpSpPr>
-      <p:grpSpPr>
-        <a:xfrm>
-          <a:off x="0" y="0"/>
-          <a:ext cx="0" cy="0"/>
-          <a:chOff x="0" y="0"/>
-          <a:chExt cx="0" cy="0"/>
-        </a:xfrm>
-      </p:grpSpPr>
-      <p:sp>
-        <p:nvSpPr>
-          <p:cNvPr id="2" name="Title 1"/>
-          <p:cNvSpPr>
-            <a:spLocks noGrp="1"/>
-          </p:cNvSpPr>
-          <p:nvPr>
-            <p:ph type="title"/>
-          </p:nvPr>
-        </p:nvSpPr>
-        <p:spPr/>
-        <p:txBody>
-          <a:bodyPr/>
-          <a:lstStyle/>
-          <a:p>
-            <a:r>
-              <a:rPr lang="en-US" dirty="0" smtClean="0"/>
-              <a:t>Communicating Changes</a:t>
-            </a:r>
-            <a:endParaRPr lang="en-US" dirty="0"/>
-          </a:p>
-        </p:txBody>
-      </p:sp>
-      <p:sp>
-        <p:nvSpPr>
-          <p:cNvPr id="3" name="Content Placeholder 2"/>
-          <p:cNvSpPr>
-            <a:spLocks noGrp="1"/>
-          </p:cNvSpPr>
-          <p:nvPr>
-            <p:ph idx="1"/>
-          </p:nvPr>
-        </p:nvSpPr>
-        <p:spPr/>
-        <p:txBody>
-          <a:bodyPr/>
-          <a:lstStyle/>
-          <a:p>
-            <a:r>
-              <a:rPr lang="en-US" dirty="0"/>
-              <a:t>Changes to test plan must be communicated </a:t>
-            </a:r>
-            <a:r>
-              <a:rPr lang="en-US" dirty="0" smtClean="0"/>
-              <a:t>clearly</a:t>
-            </a:r>
-          </a:p>
-          <a:p>
-            <a:pPr lvl="1"/>
-            <a:r>
-              <a:rPr lang="en-US" dirty="0" smtClean="0"/>
-              <a:t>Changes </a:t>
-            </a:r>
-            <a:r>
-              <a:rPr lang="en-US" dirty="0"/>
-              <a:t>in the test plan may increase the release risk</a:t>
-            </a:r>
-          </a:p>
-          <a:p>
-            <a:pPr lvl="1"/>
-            <a:r>
-              <a:rPr lang="en-US" dirty="0"/>
-              <a:t>T</a:t>
-            </a:r>
-            <a:r>
-              <a:rPr lang="en-US" dirty="0" smtClean="0"/>
-              <a:t>he </a:t>
-            </a:r>
-            <a:r>
-              <a:rPr lang="en-US" dirty="0"/>
-              <a:t>test </a:t>
-            </a:r>
-            <a:r>
-              <a:rPr lang="en-US" dirty="0" smtClean="0"/>
-              <a:t>manager has to document </a:t>
-            </a:r>
-            <a:r>
-              <a:rPr lang="en-US" dirty="0"/>
-              <a:t>and </a:t>
-            </a:r>
-            <a:r>
-              <a:rPr lang="en-US" dirty="0" smtClean="0"/>
-              <a:t>communicate </a:t>
-            </a:r>
-            <a:r>
-              <a:rPr lang="en-US" dirty="0"/>
-              <a:t>every change in the </a:t>
-            </a:r>
-            <a:r>
-              <a:rPr lang="en-US" dirty="0" smtClean="0"/>
-              <a:t>plans</a:t>
-            </a:r>
-            <a:endParaRPr lang="en-US" dirty="0"/>
-          </a:p>
-        </p:txBody>
-      </p:sp>
-      <p:sp>
-        <p:nvSpPr>
-          <p:cNvPr id="4" name="Slide Number Placeholder 3"/>
-          <p:cNvSpPr>
-            <a:spLocks noGrp="1"/>
-          </p:cNvSpPr>
-          <p:nvPr>
-            <p:ph type="sldNum" sz="quarter" idx="10"/>
-          </p:nvPr>
-        </p:nvSpPr>
-        <p:spPr/>
-        <p:txBody>
-          <a:bodyPr/>
-          <a:lstStyle/>
-          <a:p>
-            <a:pPr>
-              <a:defRPr/>
-            </a:pPr>
-            <a:fld id="{58452FF4-89E3-4D1B-9927-2DBDC00E58D7}" type="slidenum">
-              <a:rPr lang="en-US" smtClean="0"/>
-              <a:pPr>
-                <a:defRPr/>
-              </a:pPr>
-              <a:t>22</a:t>
             </a:fld>
             <a:endParaRPr lang="en-US" dirty="0"/>
           </a:p>
@@ -10010,7 +9790,7 @@
 </p:sld>
 </file>
 
-<file path=ppt/slides/slide23.xml><?xml version="1.0" encoding="utf-8"?>
+<file path=ppt/slides/slide22.xml><?xml version="1.0" encoding="utf-8"?>
 <p:sld xmlns:a="http://schemas.openxmlformats.org/drawingml/2006/main" xmlns:r="http://schemas.openxmlformats.org/officeDocument/2006/relationships" xmlns:p="http://schemas.openxmlformats.org/presentationml/2006/main">
   <p:cSld>
     <p:spTree>
@@ -10791,7 +10571,7 @@
 </p:sld>
 </file>
 
-<file path=ppt/slides/slide24.xml><?xml version="1.0" encoding="utf-8"?>
+<file path=ppt/slides/slide23.xml><?xml version="1.0" encoding="utf-8"?>
 <p:sld xmlns:a="http://schemas.openxmlformats.org/drawingml/2006/main" xmlns:r="http://schemas.openxmlformats.org/officeDocument/2006/relationships" xmlns:p="http://schemas.openxmlformats.org/presentationml/2006/main">
   <p:cSld>
     <p:spTree>
@@ -12712,7 +12492,7 @@
 </file>
 
 <file path=ppt/slides/slide9.xml><?xml version="1.0" encoding="utf-8"?>
-<p:sld xmlns:a="http://schemas.openxmlformats.org/drawingml/2006/main" xmlns:r="http://schemas.openxmlformats.org/officeDocument/2006/relationships" xmlns:p="http://schemas.openxmlformats.org/presentationml/2006/main" show="0">
+<p:sld xmlns:a="http://schemas.openxmlformats.org/drawingml/2006/main" xmlns:r="http://schemas.openxmlformats.org/officeDocument/2006/relationships" xmlns:p="http://schemas.openxmlformats.org/presentationml/2006/main">
   <p:cSld>
     <p:spTree>
       <p:nvGrpSpPr>
@@ -13005,11 +12785,11 @@
   <p:clrMapOvr>
     <a:masterClrMapping/>
   </p:clrMapOvr>
-  <mc:AlternateContent xmlns:mc="http://schemas.openxmlformats.org/markup-compatibility/2006" xmlns:p14="http://schemas.microsoft.com/office/powerpoint/2010/main">
-    <mc:Choice Requires="p14">
+  <mc:AlternateContent xmlns:mc="http://schemas.openxmlformats.org/markup-compatibility/2006">
+    <mc:Choice xmlns:p14="http://schemas.microsoft.com/office/powerpoint/2010/main" Requires="p14">
       <p:transition spd="slow" p14:dur="2000"/>
     </mc:Choice>
-    <mc:Fallback xmlns="">
+    <mc:Fallback>
       <p:transition spd="slow"/>
     </mc:Fallback>
   </mc:AlternateContent>

</xml_diff>